<commit_message>
updated thesis: 8th May
</commit_message>
<xml_diff>
--- a/Dissertation/Figures/Figures.pptx
+++ b/Dissertation/Figures/Figures.pptx
@@ -292,7 +292,7 @@
           <a:p>
             <a:fld id="{27A58F4A-DB3A-4AF3-A615-0E0692002C84}" type="datetimeFigureOut">
               <a:rPr lang="zh-CN" altLang="en-US" smtClean="0"/>
-              <a:t>2024/5/3</a:t>
+              <a:t>2024/5/6</a:t>
             </a:fld>
             <a:endParaRPr lang="zh-CN" altLang="en-US"/>
           </a:p>
@@ -490,7 +490,7 @@
           <a:p>
             <a:fld id="{27A58F4A-DB3A-4AF3-A615-0E0692002C84}" type="datetimeFigureOut">
               <a:rPr lang="zh-CN" altLang="en-US" smtClean="0"/>
-              <a:t>2024/5/3</a:t>
+              <a:t>2024/5/6</a:t>
             </a:fld>
             <a:endParaRPr lang="zh-CN" altLang="en-US"/>
           </a:p>
@@ -698,7 +698,7 @@
           <a:p>
             <a:fld id="{27A58F4A-DB3A-4AF3-A615-0E0692002C84}" type="datetimeFigureOut">
               <a:rPr lang="zh-CN" altLang="en-US" smtClean="0"/>
-              <a:t>2024/5/3</a:t>
+              <a:t>2024/5/6</a:t>
             </a:fld>
             <a:endParaRPr lang="zh-CN" altLang="en-US"/>
           </a:p>
@@ -896,7 +896,7 @@
           <a:p>
             <a:fld id="{27A58F4A-DB3A-4AF3-A615-0E0692002C84}" type="datetimeFigureOut">
               <a:rPr lang="zh-CN" altLang="en-US" smtClean="0"/>
-              <a:t>2024/5/3</a:t>
+              <a:t>2024/5/6</a:t>
             </a:fld>
             <a:endParaRPr lang="zh-CN" altLang="en-US"/>
           </a:p>
@@ -1171,7 +1171,7 @@
           <a:p>
             <a:fld id="{27A58F4A-DB3A-4AF3-A615-0E0692002C84}" type="datetimeFigureOut">
               <a:rPr lang="zh-CN" altLang="en-US" smtClean="0"/>
-              <a:t>2024/5/3</a:t>
+              <a:t>2024/5/6</a:t>
             </a:fld>
             <a:endParaRPr lang="zh-CN" altLang="en-US"/>
           </a:p>
@@ -1436,7 +1436,7 @@
           <a:p>
             <a:fld id="{27A58F4A-DB3A-4AF3-A615-0E0692002C84}" type="datetimeFigureOut">
               <a:rPr lang="zh-CN" altLang="en-US" smtClean="0"/>
-              <a:t>2024/5/3</a:t>
+              <a:t>2024/5/6</a:t>
             </a:fld>
             <a:endParaRPr lang="zh-CN" altLang="en-US"/>
           </a:p>
@@ -1848,7 +1848,7 @@
           <a:p>
             <a:fld id="{27A58F4A-DB3A-4AF3-A615-0E0692002C84}" type="datetimeFigureOut">
               <a:rPr lang="zh-CN" altLang="en-US" smtClean="0"/>
-              <a:t>2024/5/3</a:t>
+              <a:t>2024/5/6</a:t>
             </a:fld>
             <a:endParaRPr lang="zh-CN" altLang="en-US"/>
           </a:p>
@@ -1989,7 +1989,7 @@
           <a:p>
             <a:fld id="{27A58F4A-DB3A-4AF3-A615-0E0692002C84}" type="datetimeFigureOut">
               <a:rPr lang="zh-CN" altLang="en-US" smtClean="0"/>
-              <a:t>2024/5/3</a:t>
+              <a:t>2024/5/6</a:t>
             </a:fld>
             <a:endParaRPr lang="zh-CN" altLang="en-US"/>
           </a:p>
@@ -2102,7 +2102,7 @@
           <a:p>
             <a:fld id="{27A58F4A-DB3A-4AF3-A615-0E0692002C84}" type="datetimeFigureOut">
               <a:rPr lang="zh-CN" altLang="en-US" smtClean="0"/>
-              <a:t>2024/5/3</a:t>
+              <a:t>2024/5/6</a:t>
             </a:fld>
             <a:endParaRPr lang="zh-CN" altLang="en-US"/>
           </a:p>
@@ -2413,7 +2413,7 @@
           <a:p>
             <a:fld id="{27A58F4A-DB3A-4AF3-A615-0E0692002C84}" type="datetimeFigureOut">
               <a:rPr lang="zh-CN" altLang="en-US" smtClean="0"/>
-              <a:t>2024/5/3</a:t>
+              <a:t>2024/5/6</a:t>
             </a:fld>
             <a:endParaRPr lang="zh-CN" altLang="en-US"/>
           </a:p>
@@ -2701,7 +2701,7 @@
           <a:p>
             <a:fld id="{27A58F4A-DB3A-4AF3-A615-0E0692002C84}" type="datetimeFigureOut">
               <a:rPr lang="zh-CN" altLang="en-US" smtClean="0"/>
-              <a:t>2024/5/3</a:t>
+              <a:t>2024/5/6</a:t>
             </a:fld>
             <a:endParaRPr lang="zh-CN" altLang="en-US"/>
           </a:p>
@@ -2942,7 +2942,7 @@
           <a:p>
             <a:fld id="{27A58F4A-DB3A-4AF3-A615-0E0692002C84}" type="datetimeFigureOut">
               <a:rPr lang="zh-CN" altLang="en-US" smtClean="0"/>
-              <a:t>2024/5/3</a:t>
+              <a:t>2024/5/6</a:t>
             </a:fld>
             <a:endParaRPr lang="zh-CN" altLang="en-US"/>
           </a:p>
@@ -23173,8 +23173,8 @@
           </a:fontRef>
         </p:style>
       </p:cxnSp>
-      <mc:AlternateContent xmlns:mc="http://schemas.openxmlformats.org/markup-compatibility/2006">
-        <mc:Choice xmlns:a14="http://schemas.microsoft.com/office/drawing/2010/main" Requires="a14">
+      <mc:AlternateContent xmlns:mc="http://schemas.openxmlformats.org/markup-compatibility/2006" xmlns:a14="http://schemas.microsoft.com/office/drawing/2010/main">
+        <mc:Choice Requires="a14">
           <p:sp>
             <p:nvSpPr>
               <p:cNvPr id="7" name="文本框 6">
@@ -23231,7 +23231,7 @@
             </p:txBody>
           </p:sp>
         </mc:Choice>
-        <mc:Fallback>
+        <mc:Fallback xmlns="">
           <p:sp>
             <p:nvSpPr>
               <p:cNvPr id="7" name="文本框 6">
@@ -23276,8 +23276,8 @@
           </p:sp>
         </mc:Fallback>
       </mc:AlternateContent>
-      <mc:AlternateContent xmlns:mc="http://schemas.openxmlformats.org/markup-compatibility/2006">
-        <mc:Choice xmlns:a14="http://schemas.microsoft.com/office/drawing/2010/main" Requires="a14">
+      <mc:AlternateContent xmlns:mc="http://schemas.openxmlformats.org/markup-compatibility/2006" xmlns:a14="http://schemas.microsoft.com/office/drawing/2010/main">
+        <mc:Choice Requires="a14">
           <p:sp>
             <p:nvSpPr>
               <p:cNvPr id="8" name="文本框 7">
@@ -23334,7 +23334,7 @@
             </p:txBody>
           </p:sp>
         </mc:Choice>
-        <mc:Fallback>
+        <mc:Fallback xmlns="">
           <p:sp>
             <p:nvSpPr>
               <p:cNvPr id="8" name="文本框 7">
@@ -23379,8 +23379,8 @@
           </p:sp>
         </mc:Fallback>
       </mc:AlternateContent>
-      <mc:AlternateContent xmlns:mc="http://schemas.openxmlformats.org/markup-compatibility/2006">
-        <mc:Choice xmlns:a14="http://schemas.microsoft.com/office/drawing/2010/main" Requires="a14">
+      <mc:AlternateContent xmlns:mc="http://schemas.openxmlformats.org/markup-compatibility/2006" xmlns:a14="http://schemas.microsoft.com/office/drawing/2010/main">
+        <mc:Choice Requires="a14">
           <p:sp>
             <p:nvSpPr>
               <p:cNvPr id="9" name="文本框 8">
@@ -23437,7 +23437,7 @@
             </p:txBody>
           </p:sp>
         </mc:Choice>
-        <mc:Fallback>
+        <mc:Fallback xmlns="">
           <p:sp>
             <p:nvSpPr>
               <p:cNvPr id="9" name="文本框 8">
@@ -23482,8 +23482,8 @@
           </p:sp>
         </mc:Fallback>
       </mc:AlternateContent>
-      <mc:AlternateContent xmlns:mc="http://schemas.openxmlformats.org/markup-compatibility/2006">
-        <mc:Choice xmlns:a14="http://schemas.microsoft.com/office/drawing/2010/main" Requires="a14">
+      <mc:AlternateContent xmlns:mc="http://schemas.openxmlformats.org/markup-compatibility/2006" xmlns:a14="http://schemas.microsoft.com/office/drawing/2010/main">
+        <mc:Choice Requires="a14">
           <p:sp>
             <p:nvSpPr>
               <p:cNvPr id="10" name="文本框 9">
@@ -23540,7 +23540,7 @@
             </p:txBody>
           </p:sp>
         </mc:Choice>
-        <mc:Fallback>
+        <mc:Fallback xmlns="">
           <p:sp>
             <p:nvSpPr>
               <p:cNvPr id="10" name="文本框 9">
@@ -23585,8 +23585,8 @@
           </p:sp>
         </mc:Fallback>
       </mc:AlternateContent>
-      <mc:AlternateContent xmlns:mc="http://schemas.openxmlformats.org/markup-compatibility/2006">
-        <mc:Choice xmlns:a14="http://schemas.microsoft.com/office/drawing/2010/main" Requires="a14">
+      <mc:AlternateContent xmlns:mc="http://schemas.openxmlformats.org/markup-compatibility/2006" xmlns:a14="http://schemas.microsoft.com/office/drawing/2010/main">
+        <mc:Choice Requires="a14">
           <p:sp>
             <p:nvSpPr>
               <p:cNvPr id="11" name="文本框 10">
@@ -23643,7 +23643,7 @@
             </p:txBody>
           </p:sp>
         </mc:Choice>
-        <mc:Fallback>
+        <mc:Fallback xmlns="">
           <p:sp>
             <p:nvSpPr>
               <p:cNvPr id="11" name="文本框 10">
@@ -24190,8 +24190,8 @@
           </a:fontRef>
         </p:style>
       </p:cxnSp>
-      <mc:AlternateContent xmlns:mc="http://schemas.openxmlformats.org/markup-compatibility/2006">
-        <mc:Choice xmlns:a14="http://schemas.microsoft.com/office/drawing/2010/main" Requires="a14">
+      <mc:AlternateContent xmlns:mc="http://schemas.openxmlformats.org/markup-compatibility/2006" xmlns:a14="http://schemas.microsoft.com/office/drawing/2010/main">
+        <mc:Choice Requires="a14">
           <p:sp>
             <p:nvSpPr>
               <p:cNvPr id="45" name="文本框 44">
@@ -24220,6 +24220,7 @@
               </a:bodyPr>
               <a:lstStyle/>
               <a:p>
+                <a:pPr/>
                 <a14:m>
                   <m:oMathPara xmlns:m="http://schemas.openxmlformats.org/officeDocument/2006/math">
                     <m:oMathParaPr>
@@ -24265,7 +24266,7 @@
             </p:txBody>
           </p:sp>
         </mc:Choice>
-        <mc:Fallback>
+        <mc:Fallback xmlns="">
           <p:sp>
             <p:nvSpPr>
               <p:cNvPr id="45" name="文本框 44">
@@ -24310,8 +24311,8 @@
           </p:sp>
         </mc:Fallback>
       </mc:AlternateContent>
-      <mc:AlternateContent xmlns:mc="http://schemas.openxmlformats.org/markup-compatibility/2006">
-        <mc:Choice xmlns:a14="http://schemas.microsoft.com/office/drawing/2010/main" Requires="a14">
+      <mc:AlternateContent xmlns:mc="http://schemas.openxmlformats.org/markup-compatibility/2006" xmlns:a14="http://schemas.microsoft.com/office/drawing/2010/main">
+        <mc:Choice Requires="a14">
           <p:sp>
             <p:nvSpPr>
               <p:cNvPr id="46" name="文本框 45">
@@ -24340,6 +24341,7 @@
               </a:bodyPr>
               <a:lstStyle/>
               <a:p>
+                <a:pPr/>
                 <a14:m>
                   <m:oMathPara xmlns:m="http://schemas.openxmlformats.org/officeDocument/2006/math">
                     <m:oMathParaPr>
@@ -24385,7 +24387,7 @@
             </p:txBody>
           </p:sp>
         </mc:Choice>
-        <mc:Fallback>
+        <mc:Fallback xmlns="">
           <p:sp>
             <p:nvSpPr>
               <p:cNvPr id="46" name="文本框 45">
@@ -24430,8 +24432,8 @@
           </p:sp>
         </mc:Fallback>
       </mc:AlternateContent>
-      <mc:AlternateContent xmlns:mc="http://schemas.openxmlformats.org/markup-compatibility/2006">
-        <mc:Choice xmlns:a14="http://schemas.microsoft.com/office/drawing/2010/main" Requires="a14">
+      <mc:AlternateContent xmlns:mc="http://schemas.openxmlformats.org/markup-compatibility/2006" xmlns:a14="http://schemas.microsoft.com/office/drawing/2010/main">
+        <mc:Choice Requires="a14">
           <p:sp>
             <p:nvSpPr>
               <p:cNvPr id="47" name="文本框 46">
@@ -24460,6 +24462,7 @@
               </a:bodyPr>
               <a:lstStyle/>
               <a:p>
+                <a:pPr/>
                 <a14:m>
                   <m:oMathPara xmlns:m="http://schemas.openxmlformats.org/officeDocument/2006/math">
                     <m:oMathParaPr>
@@ -24505,7 +24508,7 @@
             </p:txBody>
           </p:sp>
         </mc:Choice>
-        <mc:Fallback>
+        <mc:Fallback xmlns="">
           <p:sp>
             <p:nvSpPr>
               <p:cNvPr id="47" name="文本框 46">
@@ -24550,8 +24553,8 @@
           </p:sp>
         </mc:Fallback>
       </mc:AlternateContent>
-      <mc:AlternateContent xmlns:mc="http://schemas.openxmlformats.org/markup-compatibility/2006">
-        <mc:Choice xmlns:a14="http://schemas.microsoft.com/office/drawing/2010/main" Requires="a14">
+      <mc:AlternateContent xmlns:mc="http://schemas.openxmlformats.org/markup-compatibility/2006" xmlns:a14="http://schemas.microsoft.com/office/drawing/2010/main">
+        <mc:Choice Requires="a14">
           <p:sp>
             <p:nvSpPr>
               <p:cNvPr id="48" name="文本框 47">
@@ -24580,6 +24583,7 @@
               </a:bodyPr>
               <a:lstStyle/>
               <a:p>
+                <a:pPr/>
                 <a14:m>
                   <m:oMathPara xmlns:m="http://schemas.openxmlformats.org/officeDocument/2006/math">
                     <m:oMathParaPr>
@@ -24625,7 +24629,7 @@
             </p:txBody>
           </p:sp>
         </mc:Choice>
-        <mc:Fallback>
+        <mc:Fallback xmlns="">
           <p:sp>
             <p:nvSpPr>
               <p:cNvPr id="48" name="文本框 47">
@@ -24670,8 +24674,8 @@
           </p:sp>
         </mc:Fallback>
       </mc:AlternateContent>
-      <mc:AlternateContent xmlns:mc="http://schemas.openxmlformats.org/markup-compatibility/2006">
-        <mc:Choice xmlns:a14="http://schemas.microsoft.com/office/drawing/2010/main" Requires="a14">
+      <mc:AlternateContent xmlns:mc="http://schemas.openxmlformats.org/markup-compatibility/2006" xmlns:a14="http://schemas.microsoft.com/office/drawing/2010/main">
+        <mc:Choice Requires="a14">
           <p:sp>
             <p:nvSpPr>
               <p:cNvPr id="49" name="文本框 48">
@@ -24700,6 +24704,7 @@
               </a:bodyPr>
               <a:lstStyle/>
               <a:p>
+                <a:pPr/>
                 <a14:m>
                   <m:oMathPara xmlns:m="http://schemas.openxmlformats.org/officeDocument/2006/math">
                     <m:oMathParaPr>
@@ -24745,7 +24750,7 @@
             </p:txBody>
           </p:sp>
         </mc:Choice>
-        <mc:Fallback>
+        <mc:Fallback xmlns="">
           <p:sp>
             <p:nvSpPr>
               <p:cNvPr id="49" name="文本框 48">
@@ -24790,8 +24795,8 @@
           </p:sp>
         </mc:Fallback>
       </mc:AlternateContent>
-      <mc:AlternateContent xmlns:mc="http://schemas.openxmlformats.org/markup-compatibility/2006">
-        <mc:Choice xmlns:a14="http://schemas.microsoft.com/office/drawing/2010/main" Requires="a14">
+      <mc:AlternateContent xmlns:mc="http://schemas.openxmlformats.org/markup-compatibility/2006" xmlns:a14="http://schemas.microsoft.com/office/drawing/2010/main">
+        <mc:Choice Requires="a14">
           <p:sp>
             <p:nvSpPr>
               <p:cNvPr id="50" name="文本框 49">
@@ -24820,6 +24825,7 @@
               </a:bodyPr>
               <a:lstStyle/>
               <a:p>
+                <a:pPr/>
                 <a14:m>
                   <m:oMathPara xmlns:m="http://schemas.openxmlformats.org/officeDocument/2006/math">
                     <m:oMathParaPr>
@@ -24865,7 +24871,7 @@
             </p:txBody>
           </p:sp>
         </mc:Choice>
-        <mc:Fallback>
+        <mc:Fallback xmlns="">
           <p:sp>
             <p:nvSpPr>
               <p:cNvPr id="50" name="文本框 49">
@@ -24910,8 +24916,8 @@
           </p:sp>
         </mc:Fallback>
       </mc:AlternateContent>
-      <mc:AlternateContent xmlns:mc="http://schemas.openxmlformats.org/markup-compatibility/2006">
-        <mc:Choice xmlns:a14="http://schemas.microsoft.com/office/drawing/2010/main" Requires="a14">
+      <mc:AlternateContent xmlns:mc="http://schemas.openxmlformats.org/markup-compatibility/2006" xmlns:a14="http://schemas.microsoft.com/office/drawing/2010/main">
+        <mc:Choice Requires="a14">
           <p:sp>
             <p:nvSpPr>
               <p:cNvPr id="51" name="文本框 50">
@@ -24940,6 +24946,7 @@
               </a:bodyPr>
               <a:lstStyle/>
               <a:p>
+                <a:pPr/>
                 <a14:m>
                   <m:oMathPara xmlns:m="http://schemas.openxmlformats.org/officeDocument/2006/math">
                     <m:oMathParaPr>
@@ -24985,7 +24992,7 @@
             </p:txBody>
           </p:sp>
         </mc:Choice>
-        <mc:Fallback>
+        <mc:Fallback xmlns="">
           <p:sp>
             <p:nvSpPr>
               <p:cNvPr id="51" name="文本框 50">
@@ -25030,8 +25037,8 @@
           </p:sp>
         </mc:Fallback>
       </mc:AlternateContent>
-      <mc:AlternateContent xmlns:mc="http://schemas.openxmlformats.org/markup-compatibility/2006">
-        <mc:Choice xmlns:a14="http://schemas.microsoft.com/office/drawing/2010/main" Requires="a14">
+      <mc:AlternateContent xmlns:mc="http://schemas.openxmlformats.org/markup-compatibility/2006" xmlns:a14="http://schemas.microsoft.com/office/drawing/2010/main">
+        <mc:Choice Requires="a14">
           <p:sp>
             <p:nvSpPr>
               <p:cNvPr id="52" name="文本框 51">
@@ -25060,6 +25067,7 @@
               </a:bodyPr>
               <a:lstStyle/>
               <a:p>
+                <a:pPr/>
                 <a14:m>
                   <m:oMathPara xmlns:m="http://schemas.openxmlformats.org/officeDocument/2006/math">
                     <m:oMathParaPr>
@@ -25105,7 +25113,7 @@
             </p:txBody>
           </p:sp>
         </mc:Choice>
-        <mc:Fallback>
+        <mc:Fallback xmlns="">
           <p:sp>
             <p:nvSpPr>
               <p:cNvPr id="52" name="文本框 51">
@@ -26598,8 +26606,8 @@
           </a:fontRef>
         </p:style>
       </p:cxnSp>
-      <mc:AlternateContent xmlns:mc="http://schemas.openxmlformats.org/markup-compatibility/2006" xmlns:a14="http://schemas.microsoft.com/office/drawing/2010/main">
-        <mc:Choice Requires="a14">
+      <mc:AlternateContent xmlns:mc="http://schemas.openxmlformats.org/markup-compatibility/2006">
+        <mc:Choice xmlns:a14="http://schemas.microsoft.com/office/drawing/2010/main" Requires="a14">
           <p:sp>
             <p:nvSpPr>
               <p:cNvPr id="14" name="矩形 13">
@@ -26745,33 +26753,92 @@
                           </m:r>
                         </m:num>
                         <m:den>
-                          <m:r>
-                            <a:rPr lang="en-US" altLang="zh-CN" b="0" i="1" smtClean="0">
-                              <a:solidFill>
-                                <a:schemeClr val="tx1"/>
-                              </a:solidFill>
-                              <a:latin typeface="Cambria Math" panose="02040503050406030204" pitchFamily="18" charset="0"/>
-                            </a:rPr>
-                            <m:t>𝐿𝑠</m:t>
-                          </m:r>
-                          <m:r>
-                            <a:rPr lang="en-US" altLang="zh-CN" b="0" i="1" smtClean="0">
-                              <a:solidFill>
-                                <a:schemeClr val="tx1"/>
-                              </a:solidFill>
-                              <a:latin typeface="Cambria Math" panose="02040503050406030204" pitchFamily="18" charset="0"/>
-                            </a:rPr>
-                            <m:t>+</m:t>
-                          </m:r>
-                          <m:r>
-                            <a:rPr lang="en-US" altLang="zh-CN" b="0" i="1" smtClean="0">
-                              <a:solidFill>
-                                <a:schemeClr val="tx1"/>
-                              </a:solidFill>
-                              <a:latin typeface="Cambria Math" panose="02040503050406030204" pitchFamily="18" charset="0"/>
-                            </a:rPr>
-                            <m:t>𝑅</m:t>
-                          </m:r>
+                          <m:sSub>
+                            <m:sSubPr>
+                              <m:ctrlPr>
+                                <a:rPr lang="en-US" altLang="zh-CN" b="0" i="1" smtClean="0">
+                                  <a:solidFill>
+                                    <a:schemeClr val="tx1"/>
+                                  </a:solidFill>
+                                  <a:latin typeface="Cambria Math" panose="02040503050406030204" pitchFamily="18" charset="0"/>
+                                </a:rPr>
+                              </m:ctrlPr>
+                            </m:sSubPr>
+                            <m:e>
+                              <m:sSub>
+                                <m:sSubPr>
+                                  <m:ctrlPr>
+                                    <a:rPr lang="en-US" altLang="zh-CN" i="1">
+                                      <a:solidFill>
+                                        <a:schemeClr val="tx1"/>
+                                      </a:solidFill>
+                                      <a:latin typeface="Cambria Math" panose="02040503050406030204" pitchFamily="18" charset="0"/>
+                                    </a:rPr>
+                                  </m:ctrlPr>
+                                </m:sSubPr>
+                                <m:e>
+                                  <m:r>
+                                    <a:rPr lang="en-US" altLang="zh-CN" i="1">
+                                      <a:solidFill>
+                                        <a:schemeClr val="tx1"/>
+                                      </a:solidFill>
+                                      <a:latin typeface="Cambria Math" panose="02040503050406030204" pitchFamily="18" charset="0"/>
+                                    </a:rPr>
+                                    <m:t>𝑅</m:t>
+                                  </m:r>
+                                </m:e>
+                                <m:sub>
+                                  <m:r>
+                                    <a:rPr lang="en-US" altLang="zh-CN" i="1">
+                                      <a:solidFill>
+                                        <a:schemeClr val="tx1"/>
+                                      </a:solidFill>
+                                      <a:latin typeface="Cambria Math" panose="02040503050406030204" pitchFamily="18" charset="0"/>
+                                    </a:rPr>
+                                    <m:t>𝑠</m:t>
+                                  </m:r>
+                                </m:sub>
+                              </m:sSub>
+                              <m:r>
+                                <a:rPr lang="en-US" altLang="zh-CN" b="0" i="1" smtClean="0">
+                                  <a:solidFill>
+                                    <a:schemeClr val="tx1"/>
+                                  </a:solidFill>
+                                  <a:latin typeface="Cambria Math" panose="02040503050406030204" pitchFamily="18" charset="0"/>
+                                </a:rPr>
+                                <m:t>+</m:t>
+                              </m:r>
+                              <m:r>
+                                <a:rPr lang="en-US" altLang="zh-CN" b="0" i="1" smtClean="0">
+                                  <a:solidFill>
+                                    <a:schemeClr val="tx1"/>
+                                  </a:solidFill>
+                                  <a:latin typeface="Cambria Math" panose="02040503050406030204" pitchFamily="18" charset="0"/>
+                                </a:rPr>
+                                <m:t>𝑠</m:t>
+                              </m:r>
+                              <m:r>
+                                <a:rPr lang="en-US" altLang="zh-CN" b="0" i="1" smtClean="0">
+                                  <a:solidFill>
+                                    <a:schemeClr val="tx1"/>
+                                  </a:solidFill>
+                                  <a:latin typeface="Cambria Math" panose="02040503050406030204" pitchFamily="18" charset="0"/>
+                                </a:rPr>
+                                <m:t>𝐿</m:t>
+                              </m:r>
+                            </m:e>
+                            <m:sub>
+                              <m:r>
+                                <a:rPr lang="en-US" altLang="zh-CN" b="0" i="1" smtClean="0">
+                                  <a:solidFill>
+                                    <a:schemeClr val="tx1"/>
+                                  </a:solidFill>
+                                  <a:latin typeface="Cambria Math" panose="02040503050406030204" pitchFamily="18" charset="0"/>
+                                </a:rPr>
+                                <m:t>𝑠</m:t>
+                              </m:r>
+                            </m:sub>
+                          </m:sSub>
                         </m:den>
                       </m:f>
                     </m:oMath>
@@ -26786,7 +26853,7 @@
             </p:txBody>
           </p:sp>
         </mc:Choice>
-        <mc:Fallback xmlns="">
+        <mc:Fallback>
           <p:sp>
             <p:nvSpPr>
               <p:cNvPr id="14" name="矩形 13">

</xml_diff>

<commit_message>
updated thesis: 9th May
</commit_message>
<xml_diff>
--- a/Dissertation/Figures/Figures.pptx
+++ b/Dissertation/Figures/Figures.pptx
@@ -12,6 +12,7 @@
     <p:sldId id="261" r:id="rId6"/>
     <p:sldId id="262" r:id="rId7"/>
     <p:sldId id="259" r:id="rId8"/>
+    <p:sldId id="263" r:id="rId9"/>
   </p:sldIdLst>
   <p:sldSz cx="12192000" cy="6858000"/>
   <p:notesSz cx="6858000" cy="9144000"/>
@@ -292,7 +293,7 @@
           <a:p>
             <a:fld id="{27A58F4A-DB3A-4AF3-A615-0E0692002C84}" type="datetimeFigureOut">
               <a:rPr lang="zh-CN" altLang="en-US" smtClean="0"/>
-              <a:t>2024/5/6</a:t>
+              <a:t>2024/5/9</a:t>
             </a:fld>
             <a:endParaRPr lang="zh-CN" altLang="en-US"/>
           </a:p>
@@ -490,7 +491,7 @@
           <a:p>
             <a:fld id="{27A58F4A-DB3A-4AF3-A615-0E0692002C84}" type="datetimeFigureOut">
               <a:rPr lang="zh-CN" altLang="en-US" smtClean="0"/>
-              <a:t>2024/5/6</a:t>
+              <a:t>2024/5/9</a:t>
             </a:fld>
             <a:endParaRPr lang="zh-CN" altLang="en-US"/>
           </a:p>
@@ -698,7 +699,7 @@
           <a:p>
             <a:fld id="{27A58F4A-DB3A-4AF3-A615-0E0692002C84}" type="datetimeFigureOut">
               <a:rPr lang="zh-CN" altLang="en-US" smtClean="0"/>
-              <a:t>2024/5/6</a:t>
+              <a:t>2024/5/9</a:t>
             </a:fld>
             <a:endParaRPr lang="zh-CN" altLang="en-US"/>
           </a:p>
@@ -896,7 +897,7 @@
           <a:p>
             <a:fld id="{27A58F4A-DB3A-4AF3-A615-0E0692002C84}" type="datetimeFigureOut">
               <a:rPr lang="zh-CN" altLang="en-US" smtClean="0"/>
-              <a:t>2024/5/6</a:t>
+              <a:t>2024/5/9</a:t>
             </a:fld>
             <a:endParaRPr lang="zh-CN" altLang="en-US"/>
           </a:p>
@@ -1171,7 +1172,7 @@
           <a:p>
             <a:fld id="{27A58F4A-DB3A-4AF3-A615-0E0692002C84}" type="datetimeFigureOut">
               <a:rPr lang="zh-CN" altLang="en-US" smtClean="0"/>
-              <a:t>2024/5/6</a:t>
+              <a:t>2024/5/9</a:t>
             </a:fld>
             <a:endParaRPr lang="zh-CN" altLang="en-US"/>
           </a:p>
@@ -1436,7 +1437,7 @@
           <a:p>
             <a:fld id="{27A58F4A-DB3A-4AF3-A615-0E0692002C84}" type="datetimeFigureOut">
               <a:rPr lang="zh-CN" altLang="en-US" smtClean="0"/>
-              <a:t>2024/5/6</a:t>
+              <a:t>2024/5/9</a:t>
             </a:fld>
             <a:endParaRPr lang="zh-CN" altLang="en-US"/>
           </a:p>
@@ -1848,7 +1849,7 @@
           <a:p>
             <a:fld id="{27A58F4A-DB3A-4AF3-A615-0E0692002C84}" type="datetimeFigureOut">
               <a:rPr lang="zh-CN" altLang="en-US" smtClean="0"/>
-              <a:t>2024/5/6</a:t>
+              <a:t>2024/5/9</a:t>
             </a:fld>
             <a:endParaRPr lang="zh-CN" altLang="en-US"/>
           </a:p>
@@ -1989,7 +1990,7 @@
           <a:p>
             <a:fld id="{27A58F4A-DB3A-4AF3-A615-0E0692002C84}" type="datetimeFigureOut">
               <a:rPr lang="zh-CN" altLang="en-US" smtClean="0"/>
-              <a:t>2024/5/6</a:t>
+              <a:t>2024/5/9</a:t>
             </a:fld>
             <a:endParaRPr lang="zh-CN" altLang="en-US"/>
           </a:p>
@@ -2102,7 +2103,7 @@
           <a:p>
             <a:fld id="{27A58F4A-DB3A-4AF3-A615-0E0692002C84}" type="datetimeFigureOut">
               <a:rPr lang="zh-CN" altLang="en-US" smtClean="0"/>
-              <a:t>2024/5/6</a:t>
+              <a:t>2024/5/9</a:t>
             </a:fld>
             <a:endParaRPr lang="zh-CN" altLang="en-US"/>
           </a:p>
@@ -2413,7 +2414,7 @@
           <a:p>
             <a:fld id="{27A58F4A-DB3A-4AF3-A615-0E0692002C84}" type="datetimeFigureOut">
               <a:rPr lang="zh-CN" altLang="en-US" smtClean="0"/>
-              <a:t>2024/5/6</a:t>
+              <a:t>2024/5/9</a:t>
             </a:fld>
             <a:endParaRPr lang="zh-CN" altLang="en-US"/>
           </a:p>
@@ -2701,7 +2702,7 @@
           <a:p>
             <a:fld id="{27A58F4A-DB3A-4AF3-A615-0E0692002C84}" type="datetimeFigureOut">
               <a:rPr lang="zh-CN" altLang="en-US" smtClean="0"/>
-              <a:t>2024/5/6</a:t>
+              <a:t>2024/5/9</a:t>
             </a:fld>
             <a:endParaRPr lang="zh-CN" altLang="en-US"/>
           </a:p>
@@ -2942,7 +2943,7 @@
           <a:p>
             <a:fld id="{27A58F4A-DB3A-4AF3-A615-0E0692002C84}" type="datetimeFigureOut">
               <a:rPr lang="zh-CN" altLang="en-US" smtClean="0"/>
-              <a:t>2024/5/6</a:t>
+              <a:t>2024/5/9</a:t>
             </a:fld>
             <a:endParaRPr lang="zh-CN" altLang="en-US"/>
           </a:p>
@@ -26606,8 +26607,8 @@
           </a:fontRef>
         </p:style>
       </p:cxnSp>
-      <mc:AlternateContent xmlns:mc="http://schemas.openxmlformats.org/markup-compatibility/2006">
-        <mc:Choice xmlns:a14="http://schemas.microsoft.com/office/drawing/2010/main" Requires="a14">
+      <mc:AlternateContent xmlns:mc="http://schemas.openxmlformats.org/markup-compatibility/2006" xmlns:a14="http://schemas.microsoft.com/office/drawing/2010/main">
+        <mc:Choice Requires="a14">
           <p:sp>
             <p:nvSpPr>
               <p:cNvPr id="14" name="矩形 13">
@@ -26815,16 +26816,7 @@
                                   </a:solidFill>
                                   <a:latin typeface="Cambria Math" panose="02040503050406030204" pitchFamily="18" charset="0"/>
                                 </a:rPr>
-                                <m:t>𝑠</m:t>
-                              </m:r>
-                              <m:r>
-                                <a:rPr lang="en-US" altLang="zh-CN" b="0" i="1" smtClean="0">
-                                  <a:solidFill>
-                                    <a:schemeClr val="tx1"/>
-                                  </a:solidFill>
-                                  <a:latin typeface="Cambria Math" panose="02040503050406030204" pitchFamily="18" charset="0"/>
-                                </a:rPr>
-                                <m:t>𝐿</m:t>
+                                <m:t>𝑠𝐿</m:t>
                               </m:r>
                             </m:e>
                             <m:sub>
@@ -26853,7 +26845,7 @@
             </p:txBody>
           </p:sp>
         </mc:Choice>
-        <mc:Fallback>
+        <mc:Fallback xmlns="">
           <p:sp>
             <p:nvSpPr>
               <p:cNvPr id="14" name="矩形 13">
@@ -27168,6 +27160,440 @@
     <p:extLst>
       <p:ext uri="{BB962C8B-B14F-4D97-AF65-F5344CB8AC3E}">
         <p14:creationId xmlns:p14="http://schemas.microsoft.com/office/powerpoint/2010/main" val="3831556226"/>
+      </p:ext>
+    </p:extLst>
+  </p:cSld>
+  <p:clrMapOvr>
+    <a:masterClrMapping/>
+  </p:clrMapOvr>
+</p:sld>
+</file>
+
+<file path=ppt/slides/slide8.xml><?xml version="1.0" encoding="utf-8"?>
+<p:sld xmlns:a="http://schemas.openxmlformats.org/drawingml/2006/main" xmlns:r="http://schemas.openxmlformats.org/officeDocument/2006/relationships" xmlns:p="http://schemas.openxmlformats.org/presentationml/2006/main">
+  <p:cSld>
+    <p:spTree>
+      <p:nvGrpSpPr>
+        <p:cNvPr id="1" name=""/>
+        <p:cNvGrpSpPr/>
+        <p:nvPr/>
+      </p:nvGrpSpPr>
+      <p:grpSpPr>
+        <a:xfrm>
+          <a:off x="0" y="0"/>
+          <a:ext cx="0" cy="0"/>
+          <a:chOff x="0" y="0"/>
+          <a:chExt cx="0" cy="0"/>
+        </a:xfrm>
+      </p:grpSpPr>
+      <p:pic>
+        <p:nvPicPr>
+          <p:cNvPr id="3" name="图片 2">
+            <a:extLst>
+              <a:ext uri="{FF2B5EF4-FFF2-40B4-BE49-F238E27FC236}">
+                <a16:creationId xmlns:a16="http://schemas.microsoft.com/office/drawing/2014/main" id="{8F8B6F77-564E-FBEB-794F-2B15181B0EC0}"/>
+              </a:ext>
+            </a:extLst>
+          </p:cNvPr>
+          <p:cNvPicPr>
+            <a:picLocks noChangeAspect="1"/>
+          </p:cNvPicPr>
+          <p:nvPr/>
+        </p:nvPicPr>
+        <p:blipFill>
+          <a:blip r:embed="rId2"/>
+          <a:stretch>
+            <a:fillRect/>
+          </a:stretch>
+        </p:blipFill>
+        <p:spPr>
+          <a:xfrm>
+            <a:off x="1621804" y="909286"/>
+            <a:ext cx="3029373" cy="5039428"/>
+          </a:xfrm>
+          <a:prstGeom prst="rect">
+            <a:avLst/>
+          </a:prstGeom>
+        </p:spPr>
+      </p:pic>
+      <p:sp>
+        <p:nvSpPr>
+          <p:cNvPr id="6" name="矩形 5">
+            <a:extLst>
+              <a:ext uri="{FF2B5EF4-FFF2-40B4-BE49-F238E27FC236}">
+                <a16:creationId xmlns:a16="http://schemas.microsoft.com/office/drawing/2014/main" id="{ED54211E-4F2E-55EC-F487-67EC3E78628E}"/>
+              </a:ext>
+            </a:extLst>
+          </p:cNvPr>
+          <p:cNvSpPr/>
+          <p:nvPr/>
+        </p:nvSpPr>
+        <p:spPr>
+          <a:xfrm>
+            <a:off x="1759974" y="1746080"/>
+            <a:ext cx="4021394" cy="2442462"/>
+          </a:xfrm>
+          <a:prstGeom prst="rect">
+            <a:avLst/>
+          </a:prstGeom>
+          <a:noFill/>
+          <a:ln w="25400">
+            <a:solidFill>
+              <a:schemeClr val="tx1"/>
+            </a:solidFill>
+          </a:ln>
+        </p:spPr>
+        <p:style>
+          <a:lnRef idx="2">
+            <a:schemeClr val="accent1">
+              <a:shade val="15000"/>
+            </a:schemeClr>
+          </a:lnRef>
+          <a:fillRef idx="1">
+            <a:schemeClr val="accent1"/>
+          </a:fillRef>
+          <a:effectRef idx="0">
+            <a:schemeClr val="accent1"/>
+          </a:effectRef>
+          <a:fontRef idx="minor">
+            <a:schemeClr val="lt1"/>
+          </a:fontRef>
+        </p:style>
+        <p:txBody>
+          <a:bodyPr rtlCol="0" anchor="ctr"/>
+          <a:lstStyle/>
+          <a:p>
+            <a:pPr algn="ctr"/>
+            <a:endParaRPr lang="zh-CN" altLang="en-US" dirty="0">
+              <a:solidFill>
+                <a:schemeClr val="tx1"/>
+              </a:solidFill>
+            </a:endParaRPr>
+          </a:p>
+        </p:txBody>
+      </p:sp>
+      <p:sp>
+        <p:nvSpPr>
+          <p:cNvPr id="7" name="文本框 6">
+            <a:extLst>
+              <a:ext uri="{FF2B5EF4-FFF2-40B4-BE49-F238E27FC236}">
+                <a16:creationId xmlns:a16="http://schemas.microsoft.com/office/drawing/2014/main" id="{F28186CA-6F67-E43C-AAF6-C6B714D754F0}"/>
+              </a:ext>
+            </a:extLst>
+          </p:cNvPr>
+          <p:cNvSpPr txBox="1"/>
+          <p:nvPr/>
+        </p:nvSpPr>
+        <p:spPr>
+          <a:xfrm>
+            <a:off x="4010141" y="1849318"/>
+            <a:ext cx="1880419" cy="338554"/>
+          </a:xfrm>
+          <a:prstGeom prst="rect">
+            <a:avLst/>
+          </a:prstGeom>
+          <a:noFill/>
+        </p:spPr>
+        <p:txBody>
+          <a:bodyPr wrap="square" rtlCol="0">
+            <a:spAutoFit/>
+          </a:bodyPr>
+          <a:lstStyle/>
+          <a:p>
+            <a:r>
+              <a:rPr lang="en-US" altLang="zh-CN" sz="1600" b="1" dirty="0"/>
+              <a:t>User Created Lib</a:t>
+            </a:r>
+            <a:endParaRPr lang="zh-CN" altLang="en-US" sz="1600" b="1" dirty="0"/>
+          </a:p>
+        </p:txBody>
+      </p:sp>
+      <mc:AlternateContent xmlns:mc="http://schemas.openxmlformats.org/markup-compatibility/2006">
+        <mc:Choice xmlns:a14="http://schemas.microsoft.com/office/drawing/2010/main" Requires="a14">
+          <p:sp>
+            <p:nvSpPr>
+              <p:cNvPr id="8" name="文本框 7">
+                <a:extLst>
+                  <a:ext uri="{FF2B5EF4-FFF2-40B4-BE49-F238E27FC236}">
+                    <a16:creationId xmlns:a16="http://schemas.microsoft.com/office/drawing/2014/main" id="{DEDC47DF-0BB4-0935-6FE1-4D9E1645A1BE}"/>
+                  </a:ext>
+                </a:extLst>
+              </p:cNvPr>
+              <p:cNvSpPr txBox="1"/>
+              <p:nvPr/>
+            </p:nvSpPr>
+            <p:spPr>
+              <a:xfrm>
+                <a:off x="4042096" y="4316631"/>
+                <a:ext cx="500926" cy="584775"/>
+              </a:xfrm>
+              <a:prstGeom prst="rect">
+                <a:avLst/>
+              </a:prstGeom>
+              <a:noFill/>
+            </p:spPr>
+            <p:txBody>
+              <a:bodyPr wrap="square" rtlCol="0">
+                <a:spAutoFit/>
+              </a:bodyPr>
+              <a:lstStyle/>
+              <a:p>
+                <a14:m>
+                  <m:oMathPara xmlns:m="http://schemas.openxmlformats.org/officeDocument/2006/math">
+                    <m:oMathParaPr>
+                      <m:jc m:val="centerGroup"/>
+                    </m:oMathParaPr>
+                    <m:oMath xmlns:m="http://schemas.openxmlformats.org/officeDocument/2006/math">
+                      <m:r>
+                        <a:rPr lang="en-US" altLang="zh-CN" sz="3200" b="1" i="1" smtClean="0">
+                          <a:solidFill>
+                            <a:schemeClr val="tx1"/>
+                          </a:solidFill>
+                          <a:latin typeface="Cambria Math" panose="02040503050406030204" pitchFamily="18" charset="0"/>
+                          <a:ea typeface="Cambria Math" panose="02040503050406030204" pitchFamily="18" charset="0"/>
+                        </a:rPr>
+                        <m:t>⇒</m:t>
+                      </m:r>
+                    </m:oMath>
+                  </m:oMathPara>
+                </a14:m>
+                <a:endParaRPr lang="zh-CN" altLang="en-US" sz="1600" b="1" dirty="0">
+                  <a:solidFill>
+                    <a:schemeClr val="tx1"/>
+                  </a:solidFill>
+                </a:endParaRPr>
+              </a:p>
+            </p:txBody>
+          </p:sp>
+        </mc:Choice>
+        <mc:Fallback>
+          <p:sp>
+            <p:nvSpPr>
+              <p:cNvPr id="8" name="文本框 7">
+                <a:extLst>
+                  <a:ext uri="{FF2B5EF4-FFF2-40B4-BE49-F238E27FC236}">
+                    <a16:creationId xmlns:a16="http://schemas.microsoft.com/office/drawing/2014/main" id="{DEDC47DF-0BB4-0935-6FE1-4D9E1645A1BE}"/>
+                  </a:ext>
+                </a:extLst>
+              </p:cNvPr>
+              <p:cNvSpPr txBox="1">
+                <a:spLocks noRot="1" noChangeAspect="1" noMove="1" noResize="1" noEditPoints="1" noAdjustHandles="1" noChangeArrowheads="1" noChangeShapeType="1" noTextEdit="1"/>
+              </p:cNvSpPr>
+              <p:nvPr/>
+            </p:nvSpPr>
+            <p:spPr>
+              <a:xfrm>
+                <a:off x="4042096" y="4316631"/>
+                <a:ext cx="500926" cy="584775"/>
+              </a:xfrm>
+              <a:prstGeom prst="rect">
+                <a:avLst/>
+              </a:prstGeom>
+              <a:blipFill>
+                <a:blip r:embed="rId3"/>
+                <a:stretch>
+                  <a:fillRect/>
+                </a:stretch>
+              </a:blipFill>
+            </p:spPr>
+            <p:txBody>
+              <a:bodyPr/>
+              <a:lstStyle/>
+              <a:p>
+                <a:r>
+                  <a:rPr lang="zh-CN" altLang="en-US">
+                    <a:noFill/>
+                  </a:rPr>
+                  <a:t> </a:t>
+                </a:r>
+              </a:p>
+            </p:txBody>
+          </p:sp>
+        </mc:Fallback>
+      </mc:AlternateContent>
+      <p:sp>
+        <p:nvSpPr>
+          <p:cNvPr id="11" name="文本框 10">
+            <a:extLst>
+              <a:ext uri="{FF2B5EF4-FFF2-40B4-BE49-F238E27FC236}">
+                <a16:creationId xmlns:a16="http://schemas.microsoft.com/office/drawing/2014/main" id="{1115C8F4-1482-E5F5-CD75-12AFB6FF0A61}"/>
+              </a:ext>
+            </a:extLst>
+          </p:cNvPr>
+          <p:cNvSpPr txBox="1"/>
+          <p:nvPr/>
+        </p:nvSpPr>
+        <p:spPr>
+          <a:xfrm>
+            <a:off x="4651177" y="4427715"/>
+            <a:ext cx="2743200" cy="369332"/>
+          </a:xfrm>
+          <a:prstGeom prst="rect">
+            <a:avLst/>
+          </a:prstGeom>
+          <a:noFill/>
+        </p:spPr>
+        <p:txBody>
+          <a:bodyPr wrap="square" rtlCol="0">
+            <a:spAutoFit/>
+          </a:bodyPr>
+          <a:lstStyle/>
+          <a:p>
+            <a:r>
+              <a:rPr lang="en-US" altLang="zh-CN" b="1" dirty="0"/>
+              <a:t>Library, Makefiles, etc</a:t>
+            </a:r>
+            <a:r>
+              <a:rPr lang="en-US" altLang="zh-CN" dirty="0"/>
+              <a:t>.</a:t>
+            </a:r>
+            <a:endParaRPr lang="zh-CN" altLang="en-US" dirty="0"/>
+          </a:p>
+        </p:txBody>
+      </p:sp>
+      <mc:AlternateContent xmlns:mc="http://schemas.openxmlformats.org/markup-compatibility/2006">
+        <mc:Choice xmlns:a14="http://schemas.microsoft.com/office/drawing/2010/main" Requires="a14">
+          <p:sp>
+            <p:nvSpPr>
+              <p:cNvPr id="12" name="文本框 11">
+                <a:extLst>
+                  <a:ext uri="{FF2B5EF4-FFF2-40B4-BE49-F238E27FC236}">
+                    <a16:creationId xmlns:a16="http://schemas.microsoft.com/office/drawing/2014/main" id="{2DDD6523-F4A3-3267-74AD-74A9B4714CE4}"/>
+                  </a:ext>
+                </a:extLst>
+              </p:cNvPr>
+              <p:cNvSpPr txBox="1"/>
+              <p:nvPr/>
+            </p:nvSpPr>
+            <p:spPr>
+              <a:xfrm>
+                <a:off x="2923677" y="5036220"/>
+                <a:ext cx="500926" cy="523220"/>
+              </a:xfrm>
+              <a:prstGeom prst="rect">
+                <a:avLst/>
+              </a:prstGeom>
+              <a:noFill/>
+            </p:spPr>
+            <p:txBody>
+              <a:bodyPr wrap="square" rtlCol="0">
+                <a:spAutoFit/>
+              </a:bodyPr>
+              <a:lstStyle/>
+              <a:p>
+                <a14:m>
+                  <m:oMathPara xmlns:m="http://schemas.openxmlformats.org/officeDocument/2006/math">
+                    <m:oMathParaPr>
+                      <m:jc m:val="centerGroup"/>
+                    </m:oMathParaPr>
+                    <m:oMath xmlns:m="http://schemas.openxmlformats.org/officeDocument/2006/math">
+                      <m:r>
+                        <a:rPr lang="en-US" altLang="zh-CN" sz="2800" b="1" i="1" smtClean="0">
+                          <a:solidFill>
+                            <a:schemeClr val="tx1"/>
+                          </a:solidFill>
+                          <a:latin typeface="Cambria Math" panose="02040503050406030204" pitchFamily="18" charset="0"/>
+                          <a:ea typeface="Cambria Math" panose="02040503050406030204" pitchFamily="18" charset="0"/>
+                        </a:rPr>
+                        <m:t>⇒</m:t>
+                      </m:r>
+                    </m:oMath>
+                  </m:oMathPara>
+                </a14:m>
+                <a:endParaRPr lang="zh-CN" altLang="en-US" sz="1400" b="1" dirty="0">
+                  <a:solidFill>
+                    <a:schemeClr val="tx1"/>
+                  </a:solidFill>
+                </a:endParaRPr>
+              </a:p>
+            </p:txBody>
+          </p:sp>
+        </mc:Choice>
+        <mc:Fallback>
+          <p:sp>
+            <p:nvSpPr>
+              <p:cNvPr id="12" name="文本框 11">
+                <a:extLst>
+                  <a:ext uri="{FF2B5EF4-FFF2-40B4-BE49-F238E27FC236}">
+                    <a16:creationId xmlns:a16="http://schemas.microsoft.com/office/drawing/2014/main" id="{2DDD6523-F4A3-3267-74AD-74A9B4714CE4}"/>
+                  </a:ext>
+                </a:extLst>
+              </p:cNvPr>
+              <p:cNvSpPr txBox="1">
+                <a:spLocks noRot="1" noChangeAspect="1" noMove="1" noResize="1" noEditPoints="1" noAdjustHandles="1" noChangeArrowheads="1" noChangeShapeType="1" noTextEdit="1"/>
+              </p:cNvSpPr>
+              <p:nvPr/>
+            </p:nvSpPr>
+            <p:spPr>
+              <a:xfrm>
+                <a:off x="2923677" y="5036220"/>
+                <a:ext cx="500926" cy="523220"/>
+              </a:xfrm>
+              <a:prstGeom prst="rect">
+                <a:avLst/>
+              </a:prstGeom>
+              <a:blipFill>
+                <a:blip r:embed="rId4"/>
+                <a:stretch>
+                  <a:fillRect/>
+                </a:stretch>
+              </a:blipFill>
+            </p:spPr>
+            <p:txBody>
+              <a:bodyPr/>
+              <a:lstStyle/>
+              <a:p>
+                <a:r>
+                  <a:rPr lang="zh-CN" altLang="en-US">
+                    <a:noFill/>
+                  </a:rPr>
+                  <a:t> </a:t>
+                </a:r>
+              </a:p>
+            </p:txBody>
+          </p:sp>
+        </mc:Fallback>
+      </mc:AlternateContent>
+      <p:sp>
+        <p:nvSpPr>
+          <p:cNvPr id="13" name="文本框 12">
+            <a:extLst>
+              <a:ext uri="{FF2B5EF4-FFF2-40B4-BE49-F238E27FC236}">
+                <a16:creationId xmlns:a16="http://schemas.microsoft.com/office/drawing/2014/main" id="{6D4A4541-94A2-A934-F905-9E9D37889776}"/>
+              </a:ext>
+            </a:extLst>
+          </p:cNvPr>
+          <p:cNvSpPr txBox="1"/>
+          <p:nvPr/>
+        </p:nvSpPr>
+        <p:spPr>
+          <a:xfrm>
+            <a:off x="3427060" y="5128553"/>
+            <a:ext cx="2743200" cy="338554"/>
+          </a:xfrm>
+          <a:prstGeom prst="rect">
+            <a:avLst/>
+          </a:prstGeom>
+          <a:noFill/>
+        </p:spPr>
+        <p:txBody>
+          <a:bodyPr wrap="square" rtlCol="0">
+            <a:spAutoFit/>
+          </a:bodyPr>
+          <a:lstStyle/>
+          <a:p>
+            <a:r>
+              <a:rPr lang="en-US" altLang="zh-CN" sz="1600" b="1" dirty="0"/>
+              <a:t>Main (program runs here)</a:t>
+            </a:r>
+            <a:endParaRPr lang="zh-CN" altLang="en-US" sz="1600" dirty="0"/>
+          </a:p>
+        </p:txBody>
+      </p:sp>
+    </p:spTree>
+    <p:extLst>
+      <p:ext uri="{BB962C8B-B14F-4D97-AF65-F5344CB8AC3E}">
+        <p14:creationId xmlns:p14="http://schemas.microsoft.com/office/powerpoint/2010/main" val="3031754080"/>
       </p:ext>
     </p:extLst>
   </p:cSld>

</xml_diff>